<commit_message>
add 7li7w to books
</commit_message>
<xml_diff>
--- a/presentation/scala.pptx
+++ b/presentation/scala.pptx
@@ -201,10 +201,10 @@
         <a:spcPct val="125000"/>
       </a:lnSpc>
       <a:defRPr sz="2400">
-        <a:latin typeface="Avenir Book"/>
-        <a:ea typeface="Avenir Book"/>
-        <a:cs typeface="Avenir Book"/>
-        <a:sym typeface="Avenir Book"/>
+        <a:latin typeface="Avenir Roman"/>
+        <a:ea typeface="Avenir Roman"/>
+        <a:cs typeface="Avenir Roman"/>
+        <a:sym typeface="Avenir Roman"/>
       </a:defRPr>
     </a:lvl1pPr>
     <a:lvl2pPr indent="228600" defTabSz="457200">
@@ -212,10 +212,10 @@
         <a:spcPct val="125000"/>
       </a:lnSpc>
       <a:defRPr sz="2400">
-        <a:latin typeface="Avenir Book"/>
-        <a:ea typeface="Avenir Book"/>
-        <a:cs typeface="Avenir Book"/>
-        <a:sym typeface="Avenir Book"/>
+        <a:latin typeface="Avenir Roman"/>
+        <a:ea typeface="Avenir Roman"/>
+        <a:cs typeface="Avenir Roman"/>
+        <a:sym typeface="Avenir Roman"/>
       </a:defRPr>
     </a:lvl2pPr>
     <a:lvl3pPr indent="457200" defTabSz="457200">
@@ -223,10 +223,10 @@
         <a:spcPct val="125000"/>
       </a:lnSpc>
       <a:defRPr sz="2400">
-        <a:latin typeface="Avenir Book"/>
-        <a:ea typeface="Avenir Book"/>
-        <a:cs typeface="Avenir Book"/>
-        <a:sym typeface="Avenir Book"/>
+        <a:latin typeface="Avenir Roman"/>
+        <a:ea typeface="Avenir Roman"/>
+        <a:cs typeface="Avenir Roman"/>
+        <a:sym typeface="Avenir Roman"/>
       </a:defRPr>
     </a:lvl3pPr>
     <a:lvl4pPr indent="685800" defTabSz="457200">
@@ -234,10 +234,10 @@
         <a:spcPct val="125000"/>
       </a:lnSpc>
       <a:defRPr sz="2400">
-        <a:latin typeface="Avenir Book"/>
-        <a:ea typeface="Avenir Book"/>
-        <a:cs typeface="Avenir Book"/>
-        <a:sym typeface="Avenir Book"/>
+        <a:latin typeface="Avenir Roman"/>
+        <a:ea typeface="Avenir Roman"/>
+        <a:cs typeface="Avenir Roman"/>
+        <a:sym typeface="Avenir Roman"/>
       </a:defRPr>
     </a:lvl4pPr>
     <a:lvl5pPr indent="914400" defTabSz="457200">
@@ -245,10 +245,10 @@
         <a:spcPct val="125000"/>
       </a:lnSpc>
       <a:defRPr sz="2400">
-        <a:latin typeface="Avenir Book"/>
-        <a:ea typeface="Avenir Book"/>
-        <a:cs typeface="Avenir Book"/>
-        <a:sym typeface="Avenir Book"/>
+        <a:latin typeface="Avenir Roman"/>
+        <a:ea typeface="Avenir Roman"/>
+        <a:cs typeface="Avenir Roman"/>
+        <a:sym typeface="Avenir Roman"/>
       </a:defRPr>
     </a:lvl5pPr>
     <a:lvl6pPr indent="1143000" defTabSz="457200">
@@ -256,10 +256,10 @@
         <a:spcPct val="125000"/>
       </a:lnSpc>
       <a:defRPr sz="2400">
-        <a:latin typeface="Avenir Book"/>
-        <a:ea typeface="Avenir Book"/>
-        <a:cs typeface="Avenir Book"/>
-        <a:sym typeface="Avenir Book"/>
+        <a:latin typeface="Avenir Roman"/>
+        <a:ea typeface="Avenir Roman"/>
+        <a:cs typeface="Avenir Roman"/>
+        <a:sym typeface="Avenir Roman"/>
       </a:defRPr>
     </a:lvl6pPr>
     <a:lvl7pPr indent="1371600" defTabSz="457200">
@@ -267,10 +267,10 @@
         <a:spcPct val="125000"/>
       </a:lnSpc>
       <a:defRPr sz="2400">
-        <a:latin typeface="Avenir Book"/>
-        <a:ea typeface="Avenir Book"/>
-        <a:cs typeface="Avenir Book"/>
-        <a:sym typeface="Avenir Book"/>
+        <a:latin typeface="Avenir Roman"/>
+        <a:ea typeface="Avenir Roman"/>
+        <a:cs typeface="Avenir Roman"/>
+        <a:sym typeface="Avenir Roman"/>
       </a:defRPr>
     </a:lvl7pPr>
     <a:lvl8pPr indent="1600200" defTabSz="457200">
@@ -278,10 +278,10 @@
         <a:spcPct val="125000"/>
       </a:lnSpc>
       <a:defRPr sz="2400">
-        <a:latin typeface="Avenir Book"/>
-        <a:ea typeface="Avenir Book"/>
-        <a:cs typeface="Avenir Book"/>
-        <a:sym typeface="Avenir Book"/>
+        <a:latin typeface="Avenir Roman"/>
+        <a:ea typeface="Avenir Roman"/>
+        <a:cs typeface="Avenir Roman"/>
+        <a:sym typeface="Avenir Roman"/>
       </a:defRPr>
     </a:lvl8pPr>
     <a:lvl9pPr indent="1828800" defTabSz="457200">
@@ -289,10 +289,10 @@
         <a:spcPct val="125000"/>
       </a:lnSpc>
       <a:defRPr sz="2400">
-        <a:latin typeface="Avenir Book"/>
-        <a:ea typeface="Avenir Book"/>
-        <a:cs typeface="Avenir Book"/>
-        <a:sym typeface="Avenir Book"/>
+        <a:latin typeface="Avenir Roman"/>
+        <a:ea typeface="Avenir Roman"/>
+        <a:cs typeface="Avenir Roman"/>
+        <a:sym typeface="Avenir Roman"/>
       </a:defRPr>
     </a:lvl9pPr>
   </p:notesStyle>
@@ -3156,7 +3156,7 @@
         <p:grpSpPr>
           <a:xfrm>
             <a:off x="9442790" y="8052713"/>
-            <a:ext cx="3034960" cy="1306830"/>
+            <a:ext cx="3034960" cy="1306829"/>
             <a:chOff x="0" y="0"/>
             <a:chExt cx="3034959" cy="1306828"/>
           </a:xfrm>
@@ -11251,27 +11251,27 @@
                 <a:cs typeface="Courier New"/>
                 <a:sym typeface="Courier New"/>
               </a:rPr>
-              <a:t>                   left: BinTree[A],</a:t>
-            </a:r>
-            <a:endParaRPr sz="2400">
-              <a:latin typeface="Courier New"/>
-              <a:ea typeface="Courier New"/>
-              <a:cs typeface="Courier New"/>
-              <a:sym typeface="Courier New"/>
-            </a:endParaRPr>
-          </a:p>
-          <a:p>
-            <a:pPr lvl="0" algn="l">
-              <a:defRPr sz="1800"/>
-            </a:pPr>
-            <a:r>
-              <a:rPr sz="2400">
-                <a:latin typeface="Courier New"/>
-                <a:ea typeface="Courier New"/>
-                <a:cs typeface="Courier New"/>
-                <a:sym typeface="Courier New"/>
-              </a:rPr>
-              <a:t>                   right: BinTree[A]) extends BinTree[A]</a:t>
+              <a:t>                   left:    BinTree[A],</a:t>
+            </a:r>
+            <a:endParaRPr sz="2400">
+              <a:latin typeface="Courier New"/>
+              <a:ea typeface="Courier New"/>
+              <a:cs typeface="Courier New"/>
+              <a:sym typeface="Courier New"/>
+            </a:endParaRPr>
+          </a:p>
+          <a:p>
+            <a:pPr lvl="0" algn="l">
+              <a:defRPr sz="1800"/>
+            </a:pPr>
+            <a:r>
+              <a:rPr sz="2400">
+                <a:latin typeface="Courier New"/>
+                <a:ea typeface="Courier New"/>
+                <a:cs typeface="Courier New"/>
+                <a:sym typeface="Courier New"/>
+              </a:rPr>
+              <a:t>                   right:   BinTree[A]) extends BinTree[A]</a:t>
             </a:r>
             <a:endParaRPr sz="2400">
               <a:latin typeface="Courier New"/>
@@ -11342,7 +11342,7 @@
                 <a:cs typeface="Courier New"/>
                 <a:sym typeface="Courier New"/>
               </a:rPr>
-              <a:t>        case EmptyTree =&gt; List()</a:t>
+              <a:t>        case EmptyTree     =&gt; List()</a:t>
             </a:r>
             <a:endParaRPr sz="2400">
               <a:latin typeface="Courier New"/>
@@ -13168,6 +13168,10 @@
           </p:nvPr>
         </p:nvSpPr>
         <p:spPr>
+          <a:xfrm>
+            <a:off x="571500" y="2222500"/>
+            <a:ext cx="12111945" cy="6667501"/>
+          </a:xfrm>
           <a:prstGeom prst="rect">
             <a:avLst/>
           </a:prstGeom>
@@ -13288,6 +13292,46 @@
                 </a:solidFill>
               </a:rPr>
               <a:t>Functional Programming in Scala (Manning)</a:t>
+            </a:r>
+            <a:endParaRPr sz="3600">
+              <a:solidFill>
+                <a:srgbClr val="747474"/>
+              </a:solidFill>
+            </a:endParaRPr>
+          </a:p>
+          <a:p>
+            <a:pPr lvl="0" marL="0" indent="0">
+              <a:buSzTx/>
+              <a:buFontTx/>
+              <a:buNone/>
+              <a:defRPr sz="1800">
+                <a:solidFill>
+                  <a:srgbClr val="000000"/>
+                </a:solidFill>
+              </a:defRPr>
+            </a:pPr>
+            <a:r>
+              <a:rPr sz="3600">
+                <a:solidFill>
+                  <a:srgbClr val="747474"/>
+                </a:solidFill>
+              </a:rPr>
+              <a:t>Bruce A. Tate:</a:t>
+            </a:r>
+            <a:br>
+              <a:rPr sz="3600">
+                <a:solidFill>
+                  <a:srgbClr val="747474"/>
+                </a:solidFill>
+              </a:rPr>
+            </a:br>
+            <a:r>
+              <a:rPr sz="3600">
+                <a:solidFill>
+                  <a:srgbClr val="747474"/>
+                </a:solidFill>
+              </a:rPr>
+              <a:t>Seven Languages in Seven Weeks (Pragmatic Programmers)</a:t>
             </a:r>
           </a:p>
         </p:txBody>

</xml_diff>

<commit_message>
restore accidentally deleted slide
</commit_message>
<xml_diff>
--- a/presentation/scala.pptx
+++ b/presentation/scala.pptx
@@ -40,6 +40,7 @@
     <p:sldId id="285" r:id="rId37"/>
     <p:sldId id="286" r:id="rId38"/>
     <p:sldId id="287" r:id="rId39"/>
+    <p:sldId id="288" r:id="rId40"/>
   </p:sldIdLst>
   <p:sldSz cx="13004800" cy="9753600"/>
   <p:notesSz cx="6858000" cy="9144000"/>
@@ -200,10 +201,10 @@
         <a:spcPct val="125000"/>
       </a:lnSpc>
       <a:defRPr sz="2400">
-        <a:latin typeface="Avenir Roman"/>
-        <a:ea typeface="Avenir Roman"/>
-        <a:cs typeface="Avenir Roman"/>
-        <a:sym typeface="Avenir Roman"/>
+        <a:latin typeface="Avenir Book"/>
+        <a:ea typeface="Avenir Book"/>
+        <a:cs typeface="Avenir Book"/>
+        <a:sym typeface="Avenir Book"/>
       </a:defRPr>
     </a:lvl1pPr>
     <a:lvl2pPr indent="228600" defTabSz="457200">
@@ -211,10 +212,10 @@
         <a:spcPct val="125000"/>
       </a:lnSpc>
       <a:defRPr sz="2400">
-        <a:latin typeface="Avenir Roman"/>
-        <a:ea typeface="Avenir Roman"/>
-        <a:cs typeface="Avenir Roman"/>
-        <a:sym typeface="Avenir Roman"/>
+        <a:latin typeface="Avenir Book"/>
+        <a:ea typeface="Avenir Book"/>
+        <a:cs typeface="Avenir Book"/>
+        <a:sym typeface="Avenir Book"/>
       </a:defRPr>
     </a:lvl2pPr>
     <a:lvl3pPr indent="457200" defTabSz="457200">
@@ -222,10 +223,10 @@
         <a:spcPct val="125000"/>
       </a:lnSpc>
       <a:defRPr sz="2400">
-        <a:latin typeface="Avenir Roman"/>
-        <a:ea typeface="Avenir Roman"/>
-        <a:cs typeface="Avenir Roman"/>
-        <a:sym typeface="Avenir Roman"/>
+        <a:latin typeface="Avenir Book"/>
+        <a:ea typeface="Avenir Book"/>
+        <a:cs typeface="Avenir Book"/>
+        <a:sym typeface="Avenir Book"/>
       </a:defRPr>
     </a:lvl3pPr>
     <a:lvl4pPr indent="685800" defTabSz="457200">
@@ -233,10 +234,10 @@
         <a:spcPct val="125000"/>
       </a:lnSpc>
       <a:defRPr sz="2400">
-        <a:latin typeface="Avenir Roman"/>
-        <a:ea typeface="Avenir Roman"/>
-        <a:cs typeface="Avenir Roman"/>
-        <a:sym typeface="Avenir Roman"/>
+        <a:latin typeface="Avenir Book"/>
+        <a:ea typeface="Avenir Book"/>
+        <a:cs typeface="Avenir Book"/>
+        <a:sym typeface="Avenir Book"/>
       </a:defRPr>
     </a:lvl4pPr>
     <a:lvl5pPr indent="914400" defTabSz="457200">
@@ -244,10 +245,10 @@
         <a:spcPct val="125000"/>
       </a:lnSpc>
       <a:defRPr sz="2400">
-        <a:latin typeface="Avenir Roman"/>
-        <a:ea typeface="Avenir Roman"/>
-        <a:cs typeface="Avenir Roman"/>
-        <a:sym typeface="Avenir Roman"/>
+        <a:latin typeface="Avenir Book"/>
+        <a:ea typeface="Avenir Book"/>
+        <a:cs typeface="Avenir Book"/>
+        <a:sym typeface="Avenir Book"/>
       </a:defRPr>
     </a:lvl5pPr>
     <a:lvl6pPr indent="1143000" defTabSz="457200">
@@ -255,10 +256,10 @@
         <a:spcPct val="125000"/>
       </a:lnSpc>
       <a:defRPr sz="2400">
-        <a:latin typeface="Avenir Roman"/>
-        <a:ea typeface="Avenir Roman"/>
-        <a:cs typeface="Avenir Roman"/>
-        <a:sym typeface="Avenir Roman"/>
+        <a:latin typeface="Avenir Book"/>
+        <a:ea typeface="Avenir Book"/>
+        <a:cs typeface="Avenir Book"/>
+        <a:sym typeface="Avenir Book"/>
       </a:defRPr>
     </a:lvl6pPr>
     <a:lvl7pPr indent="1371600" defTabSz="457200">
@@ -266,10 +267,10 @@
         <a:spcPct val="125000"/>
       </a:lnSpc>
       <a:defRPr sz="2400">
-        <a:latin typeface="Avenir Roman"/>
-        <a:ea typeface="Avenir Roman"/>
-        <a:cs typeface="Avenir Roman"/>
-        <a:sym typeface="Avenir Roman"/>
+        <a:latin typeface="Avenir Book"/>
+        <a:ea typeface="Avenir Book"/>
+        <a:cs typeface="Avenir Book"/>
+        <a:sym typeface="Avenir Book"/>
       </a:defRPr>
     </a:lvl7pPr>
     <a:lvl8pPr indent="1600200" defTabSz="457200">
@@ -277,10 +278,10 @@
         <a:spcPct val="125000"/>
       </a:lnSpc>
       <a:defRPr sz="2400">
-        <a:latin typeface="Avenir Roman"/>
-        <a:ea typeface="Avenir Roman"/>
-        <a:cs typeface="Avenir Roman"/>
-        <a:sym typeface="Avenir Roman"/>
+        <a:latin typeface="Avenir Book"/>
+        <a:ea typeface="Avenir Book"/>
+        <a:cs typeface="Avenir Book"/>
+        <a:sym typeface="Avenir Book"/>
       </a:defRPr>
     </a:lvl8pPr>
     <a:lvl9pPr indent="1828800" defTabSz="457200">
@@ -288,10 +289,10 @@
         <a:spcPct val="125000"/>
       </a:lnSpc>
       <a:defRPr sz="2400">
-        <a:latin typeface="Avenir Roman"/>
-        <a:ea typeface="Avenir Roman"/>
-        <a:cs typeface="Avenir Roman"/>
-        <a:sym typeface="Avenir Roman"/>
+        <a:latin typeface="Avenir Book"/>
+        <a:ea typeface="Avenir Book"/>
+        <a:cs typeface="Avenir Book"/>
+        <a:sym typeface="Avenir Book"/>
       </a:defRPr>
     </a:lvl9pPr>
   </p:notesStyle>
@@ -13321,6 +13322,204 @@
                 </a:solidFill>
               </a:rPr>
               <a:t>Seven Languages in Seven Weeks (Pragmatic Programmers)</a:t>
+            </a:r>
+          </a:p>
+        </p:txBody>
+      </p:sp>
+    </p:spTree>
+  </p:cSld>
+  <p:clrMapOvr>
+    <a:masterClrMapping/>
+  </p:clrMapOvr>
+  <p:transition spd="med" advClick="1"/>
+</p:sld>
+</file>
+
+<file path=ppt/slides/slide33.xml><?xml version="1.0" encoding="utf-8"?>
+<p:sld xmlns:a="http://schemas.openxmlformats.org/drawingml/2006/main" xmlns:r="http://schemas.openxmlformats.org/officeDocument/2006/relationships" xmlns:p="http://schemas.openxmlformats.org/presentationml/2006/main" showMasterSp="1" showMasterPhAnim="1">
+  <p:cSld>
+    <p:spTree>
+      <p:nvGrpSpPr>
+        <p:cNvPr id="1" name=""/>
+        <p:cNvGrpSpPr/>
+        <p:nvPr/>
+      </p:nvGrpSpPr>
+      <p:grpSpPr>
+        <a:xfrm>
+          <a:off x="0" y="0"/>
+          <a:ext cx="0" cy="0"/>
+          <a:chOff x="0" y="0"/>
+          <a:chExt cx="0" cy="0"/>
+        </a:xfrm>
+      </p:grpSpPr>
+      <p:sp>
+        <p:nvSpPr>
+          <p:cNvPr id="201" name="Shape 201"/>
+          <p:cNvSpPr/>
+          <p:nvPr>
+            <p:ph type="title"/>
+          </p:nvPr>
+        </p:nvSpPr>
+        <p:spPr>
+          <a:prstGeom prst="rect">
+            <a:avLst/>
+          </a:prstGeom>
+        </p:spPr>
+        <p:txBody>
+          <a:bodyPr/>
+          <a:lstStyle/>
+          <a:p>
+            <a:pPr lvl="0">
+              <a:defRPr sz="1800"/>
+            </a:pPr>
+            <a:r>
+              <a:rPr sz="4200"/>
+              <a:t>Online-Resourcen</a:t>
+            </a:r>
+          </a:p>
+        </p:txBody>
+      </p:sp>
+      <p:sp>
+        <p:nvSpPr>
+          <p:cNvPr id="202" name="Shape 202"/>
+          <p:cNvSpPr/>
+          <p:nvPr>
+            <p:ph type="body" idx="1"/>
+          </p:nvPr>
+        </p:nvSpPr>
+        <p:spPr>
+          <a:prstGeom prst="rect">
+            <a:avLst/>
+          </a:prstGeom>
+        </p:spPr>
+        <p:txBody>
+          <a:bodyPr/>
+          <a:lstStyle/>
+          <a:p>
+            <a:pPr lvl="0">
+              <a:defRPr sz="1800">
+                <a:solidFill>
+                  <a:srgbClr val="000000"/>
+                </a:solidFill>
+              </a:defRPr>
+            </a:pPr>
+            <a:r>
+              <a:rPr sz="3600">
+                <a:solidFill>
+                  <a:srgbClr val="747474"/>
+                </a:solidFill>
+              </a:rPr>
+              <a:t>http://www.scala-lang.org/</a:t>
+            </a:r>
+            <a:endParaRPr sz="3600">
+              <a:solidFill>
+                <a:srgbClr val="747474"/>
+              </a:solidFill>
+            </a:endParaRPr>
+          </a:p>
+          <a:p>
+            <a:pPr lvl="0">
+              <a:defRPr sz="1800">
+                <a:solidFill>
+                  <a:srgbClr val="000000"/>
+                </a:solidFill>
+              </a:defRPr>
+            </a:pPr>
+            <a:r>
+              <a:rPr sz="3600">
+                <a:solidFill>
+                  <a:srgbClr val="747474"/>
+                </a:solidFill>
+              </a:rPr>
+              <a:t>http://twitter.github.io/scala_school/</a:t>
+            </a:r>
+            <a:endParaRPr sz="3600">
+              <a:solidFill>
+                <a:srgbClr val="747474"/>
+              </a:solidFill>
+            </a:endParaRPr>
+          </a:p>
+          <a:p>
+            <a:pPr lvl="0">
+              <a:defRPr sz="1800">
+                <a:solidFill>
+                  <a:srgbClr val="000000"/>
+                </a:solidFill>
+              </a:defRPr>
+            </a:pPr>
+            <a:r>
+              <a:rPr sz="3600">
+                <a:solidFill>
+                  <a:srgbClr val="747474"/>
+                </a:solidFill>
+              </a:rPr>
+              <a:t>http://twitter.github.io/effectivescala/</a:t>
+            </a:r>
+            <a:endParaRPr sz="3600">
+              <a:solidFill>
+                <a:srgbClr val="747474"/>
+              </a:solidFill>
+            </a:endParaRPr>
+          </a:p>
+          <a:p>
+            <a:pPr lvl="0">
+              <a:defRPr sz="1800">
+                <a:solidFill>
+                  <a:srgbClr val="000000"/>
+                </a:solidFill>
+              </a:defRPr>
+            </a:pPr>
+            <a:r>
+              <a:rPr sz="3600">
+                <a:solidFill>
+                  <a:srgbClr val="747474"/>
+                </a:solidFill>
+              </a:rPr>
+              <a:t>https://class.coursera.org/progfun-005</a:t>
+            </a:r>
+            <a:endParaRPr sz="3600">
+              <a:solidFill>
+                <a:srgbClr val="747474"/>
+              </a:solidFill>
+            </a:endParaRPr>
+          </a:p>
+          <a:p>
+            <a:pPr lvl="0">
+              <a:defRPr sz="1800">
+                <a:solidFill>
+                  <a:srgbClr val="000000"/>
+                </a:solidFill>
+              </a:defRPr>
+            </a:pPr>
+            <a:r>
+              <a:rPr sz="3600">
+                <a:solidFill>
+                  <a:srgbClr val="747474"/>
+                </a:solidFill>
+              </a:rPr>
+              <a:t>https://class.coursera.org/reactive-001</a:t>
+            </a:r>
+            <a:endParaRPr sz="3600">
+              <a:solidFill>
+                <a:srgbClr val="747474"/>
+              </a:solidFill>
+            </a:endParaRPr>
+          </a:p>
+          <a:p>
+            <a:pPr lvl="0">
+              <a:defRPr sz="1800">
+                <a:solidFill>
+                  <a:srgbClr val="000000"/>
+                </a:solidFill>
+              </a:defRPr>
+            </a:pPr>
+            <a:r>
+              <a:rPr sz="3600">
+                <a:solidFill>
+                  <a:srgbClr val="747474"/>
+                </a:solidFill>
+              </a:rPr>
+              <a:t>https://github.com/42ways/scala_vortrag_sl/</a:t>
             </a:r>
           </a:p>
         </p:txBody>

</xml_diff>